<commit_message>
Added reminder to blow away cloud instance.
</commit_message>
<xml_diff>
--- a/Slide Deck/Hands On Hadoop.pptx
+++ b/Slide Deck/Hands On Hadoop.pptx
@@ -15199,7 +15199,7 @@
         <p:spPr>
           <a:xfrm>
             <a:off x="480046" y="1813934"/>
-            <a:ext cx="11266018" cy="3170099"/>
+            <a:ext cx="11266018" cy="3785652"/>
           </a:xfrm>
           <a:prstGeom prst="rect">
             <a:avLst/>
@@ -15257,6 +15257,18 @@
                 <a:latin typeface="Adobe Caslon Pro" panose="0205050205050A020403" pitchFamily="18" charset="0"/>
               </a:rPr>
               <a:t>Share your analysis.</a:t>
+            </a:r>
+          </a:p>
+          <a:p>
+            <a:pPr marL="742950" indent="-742950">
+              <a:buFont typeface="+mj-lt"/>
+              <a:buAutoNum type="arabicPeriod"/>
+            </a:pPr>
+            <a:r>
+              <a:rPr lang="en-US" sz="4000" dirty="0">
+                <a:latin typeface="Adobe Caslon Pro" panose="0205050205050A020403" pitchFamily="18" charset="0"/>
+              </a:rPr>
+              <a:t>(Make sure you destroy your cloud instance!)</a:t>
             </a:r>
           </a:p>
           <a:p>

</xml_diff>